<commit_message>
Finish database format draft, add info to county jail summary
</commit_message>
<xml_diff>
--- a/docs/Code-for-atlanta-pitch.pptx
+++ b/docs/Code-for-atlanta-pitch.pptx
@@ -112,6 +112,10 @@
 </p:presentation>
 </file>
 
+<file path=ppt/revisionInfo.xml><?xml version="1.0" encoding="utf-8"?>
+<p1510:revInfo xmlns:a="http://schemas.openxmlformats.org/drawingml/2006/main" xmlns:r="http://schemas.openxmlformats.org/officeDocument/2006/relationships" xmlns:p1510="http://schemas.microsoft.com/office/powerpoint/2015/10/main"/>
+</file>
+
 <file path=ppt/slideLayouts/slideLayout1.xml><?xml version="1.0" encoding="utf-8"?>
 <p:sldLayout xmlns:a="http://schemas.openxmlformats.org/drawingml/2006/main" xmlns:r="http://schemas.openxmlformats.org/officeDocument/2006/relationships" xmlns:p="http://schemas.openxmlformats.org/presentationml/2006/main" type="title" preserve="1">
   <p:cSld name="Title Slide">
@@ -241,7 +245,7 @@
           <a:p>
             <a:fld id="{B62A6EF5-1497-42ED-813A-E3CF90792F27}" type="datetimeFigureOut">
               <a:rPr lang="en-US" smtClean="0"/>
-              <a:t>9/25/2017</a:t>
+              <a:t>11/13/2017</a:t>
             </a:fld>
             <a:endParaRPr lang="en-US"/>
           </a:p>
@@ -409,7 +413,7 @@
           <a:p>
             <a:fld id="{B62A6EF5-1497-42ED-813A-E3CF90792F27}" type="datetimeFigureOut">
               <a:rPr lang="en-US" smtClean="0"/>
-              <a:t>9/25/2017</a:t>
+              <a:t>11/13/2017</a:t>
             </a:fld>
             <a:endParaRPr lang="en-US"/>
           </a:p>
@@ -587,7 +591,7 @@
           <a:p>
             <a:fld id="{B62A6EF5-1497-42ED-813A-E3CF90792F27}" type="datetimeFigureOut">
               <a:rPr lang="en-US" smtClean="0"/>
-              <a:t>9/25/2017</a:t>
+              <a:t>11/13/2017</a:t>
             </a:fld>
             <a:endParaRPr lang="en-US"/>
           </a:p>
@@ -755,7 +759,7 @@
           <a:p>
             <a:fld id="{B62A6EF5-1497-42ED-813A-E3CF90792F27}" type="datetimeFigureOut">
               <a:rPr lang="en-US" smtClean="0"/>
-              <a:t>9/25/2017</a:t>
+              <a:t>11/13/2017</a:t>
             </a:fld>
             <a:endParaRPr lang="en-US"/>
           </a:p>
@@ -1000,7 +1004,7 @@
           <a:p>
             <a:fld id="{B62A6EF5-1497-42ED-813A-E3CF90792F27}" type="datetimeFigureOut">
               <a:rPr lang="en-US" smtClean="0"/>
-              <a:t>9/25/2017</a:t>
+              <a:t>11/13/2017</a:t>
             </a:fld>
             <a:endParaRPr lang="en-US"/>
           </a:p>
@@ -1229,7 +1233,7 @@
           <a:p>
             <a:fld id="{B62A6EF5-1497-42ED-813A-E3CF90792F27}" type="datetimeFigureOut">
               <a:rPr lang="en-US" smtClean="0"/>
-              <a:t>9/25/2017</a:t>
+              <a:t>11/13/2017</a:t>
             </a:fld>
             <a:endParaRPr lang="en-US"/>
           </a:p>
@@ -1593,7 +1597,7 @@
           <a:p>
             <a:fld id="{B62A6EF5-1497-42ED-813A-E3CF90792F27}" type="datetimeFigureOut">
               <a:rPr lang="en-US" smtClean="0"/>
-              <a:t>9/25/2017</a:t>
+              <a:t>11/13/2017</a:t>
             </a:fld>
             <a:endParaRPr lang="en-US"/>
           </a:p>
@@ -1710,7 +1714,7 @@
           <a:p>
             <a:fld id="{B62A6EF5-1497-42ED-813A-E3CF90792F27}" type="datetimeFigureOut">
               <a:rPr lang="en-US" smtClean="0"/>
-              <a:t>9/25/2017</a:t>
+              <a:t>11/13/2017</a:t>
             </a:fld>
             <a:endParaRPr lang="en-US"/>
           </a:p>
@@ -1805,7 +1809,7 @@
           <a:p>
             <a:fld id="{B62A6EF5-1497-42ED-813A-E3CF90792F27}" type="datetimeFigureOut">
               <a:rPr lang="en-US" smtClean="0"/>
-              <a:t>9/25/2017</a:t>
+              <a:t>11/13/2017</a:t>
             </a:fld>
             <a:endParaRPr lang="en-US"/>
           </a:p>
@@ -2080,7 +2084,7 @@
           <a:p>
             <a:fld id="{B62A6EF5-1497-42ED-813A-E3CF90792F27}" type="datetimeFigureOut">
               <a:rPr lang="en-US" smtClean="0"/>
-              <a:t>9/25/2017</a:t>
+              <a:t>11/13/2017</a:t>
             </a:fld>
             <a:endParaRPr lang="en-US"/>
           </a:p>
@@ -2332,7 +2336,7 @@
           <a:p>
             <a:fld id="{B62A6EF5-1497-42ED-813A-E3CF90792F27}" type="datetimeFigureOut">
               <a:rPr lang="en-US" smtClean="0"/>
-              <a:t>9/25/2017</a:t>
+              <a:t>11/13/2017</a:t>
             </a:fld>
             <a:endParaRPr lang="en-US"/>
           </a:p>
@@ -2543,7 +2547,7 @@
           <a:p>
             <a:fld id="{B62A6EF5-1497-42ED-813A-E3CF90792F27}" type="datetimeFigureOut">
               <a:rPr lang="en-US" smtClean="0"/>
-              <a:t>9/25/2017</a:t>
+              <a:t>11/13/2017</a:t>
             </a:fld>
             <a:endParaRPr lang="en-US"/>
           </a:p>
@@ -3096,20 +3100,6 @@
             <a:r>
               <a:rPr lang="en-US" dirty="0"/>
               <a:t>Visualizations showing month-by-month statistics per county</a:t>
-            </a:r>
-          </a:p>
-          <a:p>
-            <a:r>
-              <a:rPr lang="en-US" dirty="0"/>
-              <a:t>Priority #1: write </a:t>
-            </a:r>
-            <a:r>
-              <a:rPr lang="en-US" dirty="0" err="1"/>
-              <a:t>webscrapers</a:t>
-            </a:r>
-            <a:r>
-              <a:rPr lang="en-US" dirty="0"/>
-              <a:t> for several counties</a:t>
             </a:r>
           </a:p>
         </p:txBody>

</xml_diff>